<commit_message>
remove setting option and add long click to delete item
</commit_message>
<xml_diff>
--- a/Progress/week3/Presentation3.pptx
+++ b/Progress/week3/Presentation3.pptx
@@ -5562,48 +5562,32 @@
       </p:sp>
       <p:pic>
         <p:nvPicPr>
-          <p:cNvPr id="85" name="Picture 84"/>
-          <p:cNvPicPr/>
+          <p:cNvPr id="3" name="Picture 2"/>
+          <p:cNvPicPr>
+            <a:picLocks noChangeAspect="1"/>
+          </p:cNvPicPr>
           <p:nvPr/>
         </p:nvPicPr>
         <p:blipFill>
-          <a:blip r:embed="rId2"/>
-          <a:stretch/>
+          <a:blip r:embed="rId2">
+            <a:extLst>
+              <a:ext uri="{28A0092B-C50C-407E-A947-70E740481C1C}">
+                <a14:useLocalDpi xmlns:a14="http://schemas.microsoft.com/office/drawing/2010/main" val="0"/>
+              </a:ext>
+            </a:extLst>
+          </a:blip>
+          <a:stretch>
+            <a:fillRect/>
+          </a:stretch>
         </p:blipFill>
         <p:spPr>
           <a:xfrm>
-            <a:off x="1698120" y="1828800"/>
-            <a:ext cx="2548080" cy="4749120"/>
-          </a:xfrm>
-          <a:prstGeom prst="rect">
-            <a:avLst/>
-          </a:prstGeom>
-          <a:ln>
-            <a:noFill/>
-          </a:ln>
-        </p:spPr>
-      </p:pic>
-      <p:pic>
-        <p:nvPicPr>
-          <p:cNvPr id="86" name="Picture 85"/>
-          <p:cNvPicPr/>
-          <p:nvPr/>
-        </p:nvPicPr>
-        <p:blipFill>
-          <a:blip r:embed="rId3"/>
-          <a:stretch/>
-        </p:blipFill>
-        <p:spPr>
-          <a:xfrm>
-            <a:off x="5642280" y="1737360"/>
-            <a:ext cx="2587320" cy="4846320"/>
-          </a:xfrm>
-          <a:prstGeom prst="rect">
-            <a:avLst/>
-          </a:prstGeom>
-          <a:ln>
-            <a:noFill/>
-          </a:ln>
+            <a:off x="1680455" y="1690200"/>
+            <a:ext cx="2629853" cy="4887720"/>
+          </a:xfrm>
+          <a:prstGeom prst="rect">
+            <a:avLst/>
+          </a:prstGeom>
         </p:spPr>
       </p:pic>
     </p:spTree>

</xml_diff>